<commit_message>
Fixed typo in learnin_python 24 presentation
</commit_message>
<xml_diff>
--- a/python/presentations/learning_python/24_ceda-py-summary.pptx
+++ b/python/presentations/learning_python/24_ceda-py-summary.pptx
@@ -687,7 +687,7 @@
               <a:pPr>
                 <a:defRPr/>
               </a:pPr>
-              <a:t>12/10/2018</a:t>
+              <a:t>18/12/2018</a:t>
             </a:fld>
             <a:endParaRPr lang="en-GB"/>
           </a:p>
@@ -924,7 +924,7 @@
               <a:pPr>
                 <a:defRPr/>
               </a:pPr>
-              <a:t>12/10/2018</a:t>
+              <a:t>18/12/2018</a:t>
             </a:fld>
             <a:endParaRPr lang="en-GB"/>
           </a:p>
@@ -1645,7 +1645,7 @@
               <a:pPr>
                 <a:defRPr/>
               </a:pPr>
-              <a:t>12/10/2018</a:t>
+              <a:t>18/12/2018</a:t>
             </a:fld>
             <a:endParaRPr lang="en-GB"/>
           </a:p>
@@ -1782,7 +1782,7 @@
               <a:pPr>
                 <a:defRPr/>
               </a:pPr>
-              <a:t>12/10/2018</a:t>
+              <a:t>18/12/2018</a:t>
             </a:fld>
             <a:endParaRPr lang="en-GB"/>
           </a:p>
@@ -3081,52 +3081,62 @@
           <a:lstStyle/>
           <a:p>
             <a:r>
-              <a:rPr lang="en-GB" altLang="en-US" smtClean="0"/>
-              <a:t>Basics and control flow, booleans</a:t>
-            </a:r>
-          </a:p>
-          <a:p>
-            <a:r>
-              <a:rPr lang="en-GB" altLang="en-US" smtClean="0"/>
+              <a:rPr lang="en-GB" altLang="en-US" dirty="0" smtClean="0"/>
+              <a:t>Basics and control flow, </a:t>
+            </a:r>
+            <a:r>
+              <a:rPr lang="en-GB" altLang="en-US" dirty="0" err="1" smtClean="0"/>
+              <a:t>booleans</a:t>
+            </a:r>
+            <a:endParaRPr lang="en-GB" altLang="en-US" dirty="0" smtClean="0"/>
+          </a:p>
+          <a:p>
+            <a:r>
+              <a:rPr lang="en-GB" altLang="en-US" dirty="0" smtClean="0"/>
               <a:t>Lists, slicing and tuples</a:t>
             </a:r>
           </a:p>
           <a:p>
             <a:r>
-              <a:rPr lang="en-GB" altLang="en-US" smtClean="0"/>
+              <a:rPr lang="en-GB" altLang="en-US" dirty="0" smtClean="0"/>
               <a:t>Input/output</a:t>
             </a:r>
           </a:p>
           <a:p>
             <a:r>
-              <a:rPr lang="en-GB" altLang="en-US" smtClean="0"/>
+              <a:rPr lang="en-GB" altLang="en-US" dirty="0" smtClean="0"/>
               <a:t>Strings and text processing</a:t>
             </a:r>
           </a:p>
           <a:p>
             <a:r>
-              <a:rPr lang="en-GB" altLang="en-US" smtClean="0"/>
+              <a:rPr lang="en-GB" altLang="en-US" dirty="0" smtClean="0"/>
               <a:t>Functions, libraries and scripts</a:t>
             </a:r>
           </a:p>
           <a:p>
             <a:r>
-              <a:rPr lang="en-GB" altLang="en-US" smtClean="0"/>
+              <a:rPr lang="en-GB" altLang="en-US" dirty="0" smtClean="0"/>
               <a:t>Sets and dictionaries</a:t>
             </a:r>
           </a:p>
           <a:p>
             <a:r>
-              <a:rPr lang="en-GB" altLang="en-US" smtClean="0"/>
-              <a:t>Errors and de-bugging</a:t>
-            </a:r>
-          </a:p>
-          <a:p>
-            <a:r>
-              <a:rPr lang="en-GB" altLang="en-US" smtClean="0"/>
+              <a:rPr lang="en-GB" altLang="en-US" dirty="0" smtClean="0"/>
+              <a:t>Errors and </a:t>
+            </a:r>
+            <a:r>
+              <a:rPr lang="en-GB" altLang="en-US" dirty="0" smtClean="0"/>
+              <a:t>debugging</a:t>
+            </a:r>
+            <a:endParaRPr lang="en-GB" altLang="en-US" dirty="0" smtClean="0"/>
+          </a:p>
+          <a:p>
+            <a:r>
+              <a:rPr lang="en-GB" altLang="en-US" dirty="0" smtClean="0"/>
               <a:t>OOP</a:t>
             </a:r>
-            <a:endParaRPr lang="en-GB" altLang="en-US" sz="1600" smtClean="0"/>
+            <a:endParaRPr lang="en-GB" altLang="en-US" sz="1600" dirty="0" smtClean="0"/>
           </a:p>
         </p:txBody>
       </p:sp>

</xml_diff>